<commit_message>
vertical flow sedimentation tanks
</commit_message>
<xml_diff>
--- a/Sedimentation_Diagrams.pptx
+++ b/Sedimentation_Diagrams.pptx
@@ -13,6 +13,7 @@
     <p:sldId id="262" r:id="rId7"/>
     <p:sldId id="264" r:id="rId8"/>
     <p:sldId id="263" r:id="rId9"/>
+    <p:sldId id="265" r:id="rId10"/>
   </p:sldIdLst>
   <p:sldSz cx="12192000" cy="6858000"/>
   <p:notesSz cx="6858000" cy="9144000"/>
@@ -3995,7 +3996,7 @@
           <a:graphicData uri="http://schemas.openxmlformats.org/presentationml/2006/ole">
             <mc:AlternateContent xmlns:mc="http://schemas.openxmlformats.org/markup-compatibility/2006">
               <mc:Choice xmlns:v="urn:schemas-microsoft-com:vml" Requires="v">
-                <p:oleObj spid="_x0000_s2064" name="Worksheet" r:id="rId3" imgW="8210421" imgH="4238730" progId="Excel.Sheet.8">
+                <p:oleObj spid="_x0000_s2067" name="Worksheet" r:id="rId3" imgW="8210421" imgH="4238730" progId="Excel.Sheet.8">
                   <p:embed followColorScheme="full"/>
                 </p:oleObj>
               </mc:Choice>
@@ -4506,7 +4507,7 @@
           <a:graphicData uri="http://schemas.openxmlformats.org/presentationml/2006/ole">
             <mc:AlternateContent xmlns:mc="http://schemas.openxmlformats.org/markup-compatibility/2006">
               <mc:Choice xmlns:v="urn:schemas-microsoft-com:vml" Requires="v">
-                <p:oleObj spid="_x0000_s3148" name="Worksheet" r:id="rId3" imgW="8210421" imgH="4238730" progId="Excel.Sheet.8">
+                <p:oleObj spid="_x0000_s3163" name="Worksheet" r:id="rId3" imgW="8210421" imgH="4238730" progId="Excel.Sheet.8">
                   <p:embed followColorScheme="full"/>
                 </p:oleObj>
               </mc:Choice>
@@ -4659,7 +4660,7 @@
           <a:graphicData uri="http://schemas.openxmlformats.org/presentationml/2006/ole">
             <mc:AlternateContent xmlns:mc="http://schemas.openxmlformats.org/markup-compatibility/2006">
               <mc:Choice xmlns:v="urn:schemas-microsoft-com:vml" Requires="v">
-                <p:oleObj spid="_x0000_s3149" name="Equation" r:id="rId5" imgW="1143000" imgH="736560" progId="Equation.DSMT4">
+                <p:oleObj spid="_x0000_s3164" name="Equation" r:id="rId5" imgW="1143000" imgH="736560" progId="Equation.DSMT4">
                   <p:embed/>
                 </p:oleObj>
               </mc:Choice>
@@ -4920,7 +4921,7 @@
           <a:graphicData uri="http://schemas.openxmlformats.org/presentationml/2006/ole">
             <mc:AlternateContent xmlns:mc="http://schemas.openxmlformats.org/markup-compatibility/2006">
               <mc:Choice xmlns:v="urn:schemas-microsoft-com:vml" Requires="v">
-                <p:oleObj spid="_x0000_s3150" name="Equation" r:id="rId7" imgW="2705040" imgH="901440" progId="Equation.DSMT4">
+                <p:oleObj spid="_x0000_s3165" name="Equation" r:id="rId7" imgW="2705040" imgH="901440" progId="Equation.DSMT4">
                   <p:embed/>
                 </p:oleObj>
               </mc:Choice>
@@ -5028,7 +5029,7 @@
           <a:graphicData uri="http://schemas.openxmlformats.org/presentationml/2006/ole">
             <mc:AlternateContent xmlns:mc="http://schemas.openxmlformats.org/markup-compatibility/2006">
               <mc:Choice xmlns:v="urn:schemas-microsoft-com:vml" Requires="v">
-                <p:oleObj spid="_x0000_s3151" name="Equation" r:id="rId9" imgW="3276360" imgH="1091880" progId="Equation.DSMT4">
+                <p:oleObj spid="_x0000_s3166" name="Equation" r:id="rId9" imgW="3276360" imgH="1091880" progId="Equation.DSMT4">
                   <p:embed/>
                 </p:oleObj>
               </mc:Choice>
@@ -5142,7 +5143,7 @@
           <a:graphicData uri="http://schemas.openxmlformats.org/presentationml/2006/ole">
             <mc:AlternateContent xmlns:mc="http://schemas.openxmlformats.org/markup-compatibility/2006">
               <mc:Choice xmlns:v="urn:schemas-microsoft-com:vml" Requires="v">
-                <p:oleObj spid="_x0000_s3152" name="Equation" r:id="rId11" imgW="1066680" imgH="736560" progId="Equation.DSMT4">
+                <p:oleObj spid="_x0000_s3167" name="Equation" r:id="rId11" imgW="1066680" imgH="736560" progId="Equation.DSMT4">
                   <p:embed/>
                 </p:oleObj>
               </mc:Choice>
@@ -7274,115 +7275,6 @@
             </a:p>
           </p:txBody>
         </p:sp>
-        <p:graphicFrame>
-          <p:nvGraphicFramePr>
-            <p:cNvPr id="7" name="Object 7">
-              <a:hlinkClick r:id="" action="ppaction://ole?verb=0"/>
-              <a:extLst>
-                <a:ext uri="{FF2B5EF4-FFF2-40B4-BE49-F238E27FC236}">
-                  <a16:creationId xmlns:a16="http://schemas.microsoft.com/office/drawing/2014/main" id="{5DDB9F19-95DC-7E45-AC1F-7295669BF9DA}"/>
-                </a:ext>
-              </a:extLst>
-            </p:cNvPr>
-            <p:cNvGraphicFramePr>
-              <a:graphicFrameLocks/>
-            </p:cNvGraphicFramePr>
-            <p:nvPr/>
-          </p:nvGraphicFramePr>
-          <p:xfrm>
-            <a:off x="3649" y="2150"/>
-            <a:ext cx="221" cy="235"/>
-          </p:xfrm>
-          <a:graphic>
-            <a:graphicData uri="http://schemas.openxmlformats.org/presentationml/2006/ole">
-              <mc:AlternateContent xmlns:mc="http://schemas.openxmlformats.org/markup-compatibility/2006">
-                <mc:Choice xmlns:v="urn:schemas-microsoft-com:vml" Requires="v">
-                  <p:oleObj spid="_x0000_s9219" name="Equation" r:id="rId3" imgW="355320" imgH="380880" progId="Equation.3">
-                    <p:embed/>
-                  </p:oleObj>
-                </mc:Choice>
-                <mc:Fallback>
-                  <p:oleObj name="Equation" r:id="rId3" imgW="355320" imgH="380880" progId="Equation.3">
-                    <p:embed/>
-                    <p:pic>
-                      <p:nvPicPr>
-                        <p:cNvPr id="7" name="Object 7">
-                          <a:hlinkClick r:id="" action="ppaction://ole?verb=0"/>
-                          <a:extLst>
-                            <a:ext uri="{FF2B5EF4-FFF2-40B4-BE49-F238E27FC236}">
-                              <a16:creationId xmlns:a16="http://schemas.microsoft.com/office/drawing/2014/main" id="{5DDB9F19-95DC-7E45-AC1F-7295669BF9DA}"/>
-                            </a:ext>
-                          </a:extLst>
-                        </p:cNvPr>
-                        <p:cNvPicPr>
-                          <a:picLocks noChangeArrowheads="1"/>
-                        </p:cNvPicPr>
-                        <p:nvPr/>
-                      </p:nvPicPr>
-                      <p:blipFill>
-                        <a:blip r:embed="rId4">
-                          <a:extLst>
-                            <a:ext uri="{28A0092B-C50C-407E-A947-70E740481C1C}">
-                              <a14:useLocalDpi xmlns:a14="http://schemas.microsoft.com/office/drawing/2010/main" val="0"/>
-                            </a:ext>
-                          </a:extLst>
-                        </a:blip>
-                        <a:srcRect/>
-                        <a:stretch>
-                          <a:fillRect/>
-                        </a:stretch>
-                      </p:blipFill>
-                      <p:spPr bwMode="auto">
-                        <a:xfrm>
-                          <a:off x="3649" y="2150"/>
-                          <a:ext cx="221" cy="235"/>
-                        </a:xfrm>
-                        <a:prstGeom prst="rect">
-                          <a:avLst/>
-                        </a:prstGeom>
-                        <a:noFill/>
-                        <a:ln>
-                          <a:noFill/>
-                        </a:ln>
-                        <a:effectLst/>
-                        <a:extLst>
-                          <a:ext uri="{909E8E84-426E-40DD-AFC4-6F175D3DCCD1}">
-                            <a14:hiddenFill xmlns:a14="http://schemas.microsoft.com/office/drawing/2010/main">
-                              <a:solidFill>
-                                <a:schemeClr val="accent1"/>
-                              </a:solidFill>
-                            </a14:hiddenFill>
-                          </a:ext>
-                          <a:ext uri="{91240B29-F687-4F45-9708-019B960494DF}">
-                            <a14:hiddenLine xmlns:a14="http://schemas.microsoft.com/office/drawing/2010/main" w="12700">
-                              <a:solidFill>
-                                <a:schemeClr val="tx1"/>
-                              </a:solidFill>
-                              <a:miter lim="800000"/>
-                              <a:headEnd/>
-                              <a:tailEnd/>
-                            </a14:hiddenLine>
-                          </a:ext>
-                          <a:ext uri="{AF507438-7753-43E0-B8FC-AC1667EBCBE1}">
-                            <a14:hiddenEffects xmlns:a14="http://schemas.microsoft.com/office/drawing/2010/main">
-                              <a:effectLst>
-                                <a:outerShdw dist="17961" dir="2700000" algn="ctr" rotWithShape="0">
-                                  <a:schemeClr val="bg2">
-                                    <a:alpha val="50000"/>
-                                  </a:schemeClr>
-                                </a:outerShdw>
-                              </a:effectLst>
-                            </a14:hiddenEffects>
-                          </a:ext>
-                        </a:extLst>
-                      </p:spPr>
-                    </p:pic>
-                  </p:oleObj>
-                </mc:Fallback>
-              </mc:AlternateContent>
-            </a:graphicData>
-          </a:graphic>
-        </p:graphicFrame>
         <p:sp>
           <p:nvSpPr>
             <p:cNvPr id="9" name="Line 9">
@@ -7951,7 +7843,7 @@
             <p:spPr>
               <a:xfrm>
                 <a:off x="5713336" y="3014463"/>
-                <a:ext cx="340671" cy="307777"/>
+                <a:ext cx="351378" cy="307777"/>
               </a:xfrm>
               <a:prstGeom prst="rect">
                 <a:avLst/>
@@ -7983,7 +7875,7 @@
                             <a:rPr lang="en-US" sz="2000" b="0" i="1" smtClean="0">
                               <a:latin typeface="Cambria Math" panose="02040503050406030204" pitchFamily="18" charset="0"/>
                             </a:rPr>
-                            <m:t>𝑉</m:t>
+                            <m:t>𝑣</m:t>
                           </m:r>
                         </m:e>
                         <m:sub>
@@ -8021,15 +7913,129 @@
             <p:spPr>
               <a:xfrm>
                 <a:off x="5713336" y="3014463"/>
-                <a:ext cx="340671" cy="307777"/>
+                <a:ext cx="351378" cy="307777"/>
               </a:xfrm>
               <a:prstGeom prst="rect">
                 <a:avLst/>
               </a:prstGeom>
               <a:blipFill>
-                <a:blip r:embed="rId5"/>
+                <a:blip r:embed="rId2"/>
                 <a:stretch>
-                  <a:fillRect l="-14286" b="-7692"/>
+                  <a:fillRect l="-10345" b="-7692"/>
+                </a:stretch>
+              </a:blipFill>
+            </p:spPr>
+            <p:txBody>
+              <a:bodyPr/>
+              <a:lstStyle/>
+              <a:p>
+                <a:r>
+                  <a:rPr lang="en-US">
+                    <a:noFill/>
+                  </a:rPr>
+                  <a:t> </a:t>
+                </a:r>
+              </a:p>
+            </p:txBody>
+          </p:sp>
+        </mc:Fallback>
+      </mc:AlternateContent>
+      <mc:AlternateContent xmlns:mc="http://schemas.openxmlformats.org/markup-compatibility/2006">
+        <mc:Choice xmlns:a14="http://schemas.microsoft.com/office/drawing/2010/main" Requires="a14">
+          <p:sp>
+            <p:nvSpPr>
+              <p:cNvPr id="21" name="TextBox 20">
+                <a:extLst>
+                  <a:ext uri="{FF2B5EF4-FFF2-40B4-BE49-F238E27FC236}">
+                    <a16:creationId xmlns:a16="http://schemas.microsoft.com/office/drawing/2014/main" id="{7848F7D9-8F7D-394A-8EA6-7CE1FB48CD94}"/>
+                  </a:ext>
+                </a:extLst>
+              </p:cNvPr>
+              <p:cNvSpPr txBox="1"/>
+              <p:nvPr/>
+            </p:nvSpPr>
+            <p:spPr>
+              <a:xfrm>
+                <a:off x="4823329" y="3616324"/>
+                <a:ext cx="293349" cy="307777"/>
+              </a:xfrm>
+              <a:prstGeom prst="rect">
+                <a:avLst/>
+              </a:prstGeom>
+              <a:noFill/>
+            </p:spPr>
+            <p:txBody>
+              <a:bodyPr wrap="none" lIns="0" tIns="0" rIns="0" bIns="0" rtlCol="0">
+                <a:spAutoFit/>
+              </a:bodyPr>
+              <a:lstStyle/>
+              <a:p>
+                <a14:m>
+                  <m:oMathPara xmlns:m="http://schemas.openxmlformats.org/officeDocument/2006/math">
+                    <m:oMathParaPr>
+                      <m:jc m:val="centerGroup"/>
+                    </m:oMathParaPr>
+                    <m:oMath xmlns:m="http://schemas.openxmlformats.org/officeDocument/2006/math">
+                      <m:sSub>
+                        <m:sSubPr>
+                          <m:ctrlPr>
+                            <a:rPr lang="en-US" sz="2000" i="1" smtClean="0">
+                              <a:latin typeface="Cambria Math" panose="02040503050406030204" pitchFamily="18" charset="0"/>
+                            </a:rPr>
+                          </m:ctrlPr>
+                        </m:sSubPr>
+                        <m:e>
+                          <m:r>
+                            <a:rPr lang="en-US" sz="2000" b="0" i="1" smtClean="0">
+                              <a:latin typeface="Cambria Math" panose="02040503050406030204" pitchFamily="18" charset="0"/>
+                            </a:rPr>
+                            <m:t>𝑣</m:t>
+                          </m:r>
+                        </m:e>
+                        <m:sub>
+                          <m:r>
+                            <a:rPr lang="en-US" sz="2000" b="0" i="1" smtClean="0">
+                              <a:latin typeface="Cambria Math" panose="02040503050406030204" pitchFamily="18" charset="0"/>
+                            </a:rPr>
+                            <m:t>𝑐</m:t>
+                          </m:r>
+                        </m:sub>
+                      </m:sSub>
+                    </m:oMath>
+                  </m:oMathPara>
+                </a14:m>
+                <a:endParaRPr lang="en-US" sz="2000" dirty="0"/>
+              </a:p>
+            </p:txBody>
+          </p:sp>
+        </mc:Choice>
+        <mc:Fallback>
+          <p:sp>
+            <p:nvSpPr>
+              <p:cNvPr id="21" name="TextBox 20">
+                <a:extLst>
+                  <a:ext uri="{FF2B5EF4-FFF2-40B4-BE49-F238E27FC236}">
+                    <a16:creationId xmlns:a16="http://schemas.microsoft.com/office/drawing/2014/main" id="{7848F7D9-8F7D-394A-8EA6-7CE1FB48CD94}"/>
+                  </a:ext>
+                </a:extLst>
+              </p:cNvPr>
+              <p:cNvSpPr txBox="1">
+                <a:spLocks noRot="1" noChangeAspect="1" noMove="1" noResize="1" noEditPoints="1" noAdjustHandles="1" noChangeArrowheads="1" noChangeShapeType="1" noTextEdit="1"/>
+              </p:cNvSpPr>
+              <p:nvPr/>
+            </p:nvSpPr>
+            <p:spPr>
+              <a:xfrm>
+                <a:off x="4823329" y="3616324"/>
+                <a:ext cx="293349" cy="307777"/>
+              </a:xfrm>
+              <a:prstGeom prst="rect">
+                <a:avLst/>
+              </a:prstGeom>
+              <a:blipFill>
+                <a:blip r:embed="rId3"/>
+                <a:stretch>
+                  <a:fillRect l="-12500" b="-8000"/>
                 </a:stretch>
               </a:blipFill>
             </p:spPr>
@@ -8271,115 +8277,6 @@
             </a:p>
           </p:txBody>
         </p:sp>
-        <p:graphicFrame>
-          <p:nvGraphicFramePr>
-            <p:cNvPr id="7" name="Object 7">
-              <a:hlinkClick r:id="" action="ppaction://ole?verb=0"/>
-              <a:extLst>
-                <a:ext uri="{FF2B5EF4-FFF2-40B4-BE49-F238E27FC236}">
-                  <a16:creationId xmlns:a16="http://schemas.microsoft.com/office/drawing/2014/main" id="{5DDB9F19-95DC-7E45-AC1F-7295669BF9DA}"/>
-                </a:ext>
-              </a:extLst>
-            </p:cNvPr>
-            <p:cNvGraphicFramePr>
-              <a:graphicFrameLocks/>
-            </p:cNvGraphicFramePr>
-            <p:nvPr/>
-          </p:nvGraphicFramePr>
-          <p:xfrm>
-            <a:off x="3649" y="2150"/>
-            <a:ext cx="221" cy="235"/>
-          </p:xfrm>
-          <a:graphic>
-            <a:graphicData uri="http://schemas.openxmlformats.org/presentationml/2006/ole">
-              <mc:AlternateContent xmlns:mc="http://schemas.openxmlformats.org/markup-compatibility/2006">
-                <mc:Choice xmlns:v="urn:schemas-microsoft-com:vml" Requires="v">
-                  <p:oleObj spid="_x0000_s8195" name="Equation" r:id="rId3" imgW="355320" imgH="380880" progId="Equation.3">
-                    <p:embed/>
-                  </p:oleObj>
-                </mc:Choice>
-                <mc:Fallback>
-                  <p:oleObj name="Equation" r:id="rId3" imgW="355320" imgH="380880" progId="Equation.3">
-                    <p:embed/>
-                    <p:pic>
-                      <p:nvPicPr>
-                        <p:cNvPr id="7" name="Object 7">
-                          <a:hlinkClick r:id="" action="ppaction://ole?verb=0"/>
-                          <a:extLst>
-                            <a:ext uri="{FF2B5EF4-FFF2-40B4-BE49-F238E27FC236}">
-                              <a16:creationId xmlns:a16="http://schemas.microsoft.com/office/drawing/2014/main" id="{5DDB9F19-95DC-7E45-AC1F-7295669BF9DA}"/>
-                            </a:ext>
-                          </a:extLst>
-                        </p:cNvPr>
-                        <p:cNvPicPr>
-                          <a:picLocks noChangeArrowheads="1"/>
-                        </p:cNvPicPr>
-                        <p:nvPr/>
-                      </p:nvPicPr>
-                      <p:blipFill>
-                        <a:blip r:embed="rId4">
-                          <a:extLst>
-                            <a:ext uri="{28A0092B-C50C-407E-A947-70E740481C1C}">
-                              <a14:useLocalDpi xmlns:a14="http://schemas.microsoft.com/office/drawing/2010/main" val="0"/>
-                            </a:ext>
-                          </a:extLst>
-                        </a:blip>
-                        <a:srcRect/>
-                        <a:stretch>
-                          <a:fillRect/>
-                        </a:stretch>
-                      </p:blipFill>
-                      <p:spPr bwMode="auto">
-                        <a:xfrm>
-                          <a:off x="3649" y="2150"/>
-                          <a:ext cx="221" cy="235"/>
-                        </a:xfrm>
-                        <a:prstGeom prst="rect">
-                          <a:avLst/>
-                        </a:prstGeom>
-                        <a:noFill/>
-                        <a:ln>
-                          <a:noFill/>
-                        </a:ln>
-                        <a:effectLst/>
-                        <a:extLst>
-                          <a:ext uri="{909E8E84-426E-40DD-AFC4-6F175D3DCCD1}">
-                            <a14:hiddenFill xmlns:a14="http://schemas.microsoft.com/office/drawing/2010/main">
-                              <a:solidFill>
-                                <a:schemeClr val="accent1"/>
-                              </a:solidFill>
-                            </a14:hiddenFill>
-                          </a:ext>
-                          <a:ext uri="{91240B29-F687-4F45-9708-019B960494DF}">
-                            <a14:hiddenLine xmlns:a14="http://schemas.microsoft.com/office/drawing/2010/main" w="12700">
-                              <a:solidFill>
-                                <a:schemeClr val="tx1"/>
-                              </a:solidFill>
-                              <a:miter lim="800000"/>
-                              <a:headEnd/>
-                              <a:tailEnd/>
-                            </a14:hiddenLine>
-                          </a:ext>
-                          <a:ext uri="{AF507438-7753-43E0-B8FC-AC1667EBCBE1}">
-                            <a14:hiddenEffects xmlns:a14="http://schemas.microsoft.com/office/drawing/2010/main">
-                              <a:effectLst>
-                                <a:outerShdw dist="17961" dir="2700000" algn="ctr" rotWithShape="0">
-                                  <a:schemeClr val="bg2">
-                                    <a:alpha val="50000"/>
-                                  </a:schemeClr>
-                                </a:outerShdw>
-                              </a:effectLst>
-                            </a14:hiddenEffects>
-                          </a:ext>
-                        </a:extLst>
-                      </p:spPr>
-                    </p:pic>
-                  </p:oleObj>
-                </mc:Fallback>
-              </mc:AlternateContent>
-            </a:graphicData>
-          </a:graphic>
-        </p:graphicFrame>
         <p:sp>
           <p:nvSpPr>
             <p:cNvPr id="9" name="Line 9">
@@ -8993,7 +8890,7 @@
             <p:spPr>
               <a:xfrm>
                 <a:off x="5713336" y="3014463"/>
-                <a:ext cx="340671" cy="307777"/>
+                <a:ext cx="351378" cy="307777"/>
               </a:xfrm>
               <a:prstGeom prst="rect">
                 <a:avLst/>
@@ -9025,7 +8922,7 @@
                             <a:rPr lang="en-US" sz="2000" b="0" i="1" smtClean="0">
                               <a:latin typeface="Cambria Math" panose="02040503050406030204" pitchFamily="18" charset="0"/>
                             </a:rPr>
-                            <m:t>𝑉</m:t>
+                            <m:t>𝑣</m:t>
                           </m:r>
                         </m:e>
                         <m:sub>
@@ -9063,15 +8960,129 @@
             <p:spPr>
               <a:xfrm>
                 <a:off x="5713336" y="3014463"/>
-                <a:ext cx="340671" cy="307777"/>
+                <a:ext cx="351378" cy="307777"/>
               </a:xfrm>
               <a:prstGeom prst="rect">
                 <a:avLst/>
               </a:prstGeom>
               <a:blipFill>
-                <a:blip r:embed="rId5"/>
+                <a:blip r:embed="rId2"/>
                 <a:stretch>
-                  <a:fillRect l="-14286" b="-7692"/>
+                  <a:fillRect l="-10345" b="-7692"/>
+                </a:stretch>
+              </a:blipFill>
+            </p:spPr>
+            <p:txBody>
+              <a:bodyPr/>
+              <a:lstStyle/>
+              <a:p>
+                <a:r>
+                  <a:rPr lang="en-US">
+                    <a:noFill/>
+                  </a:rPr>
+                  <a:t> </a:t>
+                </a:r>
+              </a:p>
+            </p:txBody>
+          </p:sp>
+        </mc:Fallback>
+      </mc:AlternateContent>
+      <mc:AlternateContent xmlns:mc="http://schemas.openxmlformats.org/markup-compatibility/2006">
+        <mc:Choice xmlns:a14="http://schemas.microsoft.com/office/drawing/2010/main" Requires="a14">
+          <p:sp>
+            <p:nvSpPr>
+              <p:cNvPr id="26" name="TextBox 25">
+                <a:extLst>
+                  <a:ext uri="{FF2B5EF4-FFF2-40B4-BE49-F238E27FC236}">
+                    <a16:creationId xmlns:a16="http://schemas.microsoft.com/office/drawing/2014/main" id="{013599E5-635C-A649-AA25-90C04F46C230}"/>
+                  </a:ext>
+                </a:extLst>
+              </p:cNvPr>
+              <p:cNvSpPr txBox="1"/>
+              <p:nvPr/>
+            </p:nvSpPr>
+            <p:spPr>
+              <a:xfrm>
+                <a:off x="4823329" y="3616324"/>
+                <a:ext cx="293349" cy="307777"/>
+              </a:xfrm>
+              <a:prstGeom prst="rect">
+                <a:avLst/>
+              </a:prstGeom>
+              <a:noFill/>
+            </p:spPr>
+            <p:txBody>
+              <a:bodyPr wrap="none" lIns="0" tIns="0" rIns="0" bIns="0" rtlCol="0">
+                <a:spAutoFit/>
+              </a:bodyPr>
+              <a:lstStyle/>
+              <a:p>
+                <a14:m>
+                  <m:oMathPara xmlns:m="http://schemas.openxmlformats.org/officeDocument/2006/math">
+                    <m:oMathParaPr>
+                      <m:jc m:val="centerGroup"/>
+                    </m:oMathParaPr>
+                    <m:oMath xmlns:m="http://schemas.openxmlformats.org/officeDocument/2006/math">
+                      <m:sSub>
+                        <m:sSubPr>
+                          <m:ctrlPr>
+                            <a:rPr lang="en-US" sz="2000" i="1" smtClean="0">
+                              <a:latin typeface="Cambria Math" panose="02040503050406030204" pitchFamily="18" charset="0"/>
+                            </a:rPr>
+                          </m:ctrlPr>
+                        </m:sSubPr>
+                        <m:e>
+                          <m:r>
+                            <a:rPr lang="en-US" sz="2000" b="0" i="1" smtClean="0">
+                              <a:latin typeface="Cambria Math" panose="02040503050406030204" pitchFamily="18" charset="0"/>
+                            </a:rPr>
+                            <m:t>𝑣</m:t>
+                          </m:r>
+                        </m:e>
+                        <m:sub>
+                          <m:r>
+                            <a:rPr lang="en-US" sz="2000" b="0" i="1" smtClean="0">
+                              <a:latin typeface="Cambria Math" panose="02040503050406030204" pitchFamily="18" charset="0"/>
+                            </a:rPr>
+                            <m:t>𝑐</m:t>
+                          </m:r>
+                        </m:sub>
+                      </m:sSub>
+                    </m:oMath>
+                  </m:oMathPara>
+                </a14:m>
+                <a:endParaRPr lang="en-US" sz="2000" dirty="0"/>
+              </a:p>
+            </p:txBody>
+          </p:sp>
+        </mc:Choice>
+        <mc:Fallback>
+          <p:sp>
+            <p:nvSpPr>
+              <p:cNvPr id="26" name="TextBox 25">
+                <a:extLst>
+                  <a:ext uri="{FF2B5EF4-FFF2-40B4-BE49-F238E27FC236}">
+                    <a16:creationId xmlns:a16="http://schemas.microsoft.com/office/drawing/2014/main" id="{013599E5-635C-A649-AA25-90C04F46C230}"/>
+                  </a:ext>
+                </a:extLst>
+              </p:cNvPr>
+              <p:cNvSpPr txBox="1">
+                <a:spLocks noRot="1" noChangeAspect="1" noMove="1" noResize="1" noEditPoints="1" noAdjustHandles="1" noChangeArrowheads="1" noChangeShapeType="1" noTextEdit="1"/>
+              </p:cNvSpPr>
+              <p:nvPr/>
+            </p:nvSpPr>
+            <p:spPr>
+              <a:xfrm>
+                <a:off x="4823329" y="3616324"/>
+                <a:ext cx="293349" cy="307777"/>
+              </a:xfrm>
+              <a:prstGeom prst="rect">
+                <a:avLst/>
+              </a:prstGeom>
+              <a:blipFill>
+                <a:blip r:embed="rId3"/>
+                <a:stretch>
+                  <a:fillRect l="-12500" b="-8000"/>
                 </a:stretch>
               </a:blipFill>
             </p:spPr>
@@ -9175,6 +9186,559 @@
       </p:par>
     </p:tnLst>
   </p:timing>
+</p:sld>
+</file>
+
+<file path=ppt/slides/slide9.xml><?xml version="1.0" encoding="utf-8"?>
+<p:sld xmlns:a="http://schemas.openxmlformats.org/drawingml/2006/main" xmlns:r="http://schemas.openxmlformats.org/officeDocument/2006/relationships" xmlns:p="http://schemas.openxmlformats.org/presentationml/2006/main">
+  <p:cSld>
+    <p:spTree>
+      <p:nvGrpSpPr>
+        <p:cNvPr id="1" name=""/>
+        <p:cNvGrpSpPr/>
+        <p:nvPr/>
+      </p:nvGrpSpPr>
+      <p:grpSpPr>
+        <a:xfrm>
+          <a:off x="0" y="0"/>
+          <a:ext cx="0" cy="0"/>
+          <a:chOff x="0" y="0"/>
+          <a:chExt cx="0" cy="0"/>
+        </a:xfrm>
+      </p:grpSpPr>
+      <p:sp>
+        <p:nvSpPr>
+          <p:cNvPr id="2" name="Rectangle 4">
+            <a:extLst>
+              <a:ext uri="{FF2B5EF4-FFF2-40B4-BE49-F238E27FC236}">
+                <a16:creationId xmlns:a16="http://schemas.microsoft.com/office/drawing/2014/main" id="{5D7D3833-E955-AB40-BC1E-E13F83F56607}"/>
+              </a:ext>
+            </a:extLst>
+          </p:cNvPr>
+          <p:cNvSpPr>
+            <a:spLocks noChangeArrowheads="1"/>
+          </p:cNvSpPr>
+          <p:nvPr/>
+        </p:nvSpPr>
+        <p:spPr bwMode="auto">
+          <a:xfrm rot="16200000">
+            <a:off x="4376585" y="3475744"/>
+            <a:ext cx="2647950" cy="1116013"/>
+          </a:xfrm>
+          <a:prstGeom prst="rect">
+            <a:avLst/>
+          </a:prstGeom>
+          <a:noFill/>
+          <a:ln w="28575" cap="rnd">
+            <a:solidFill>
+              <a:schemeClr val="tx1"/>
+            </a:solidFill>
+            <a:prstDash val="sysDot"/>
+            <a:miter lim="800000"/>
+            <a:headEnd type="none" w="sm" len="sm"/>
+            <a:tailEnd type="none" w="med" len="sm"/>
+          </a:ln>
+          <a:effectLst/>
+          <a:scene3d>
+            <a:camera prst="legacyObliqueTopRight"/>
+            <a:lightRig rig="legacyFlat1" dir="t"/>
+          </a:scene3d>
+          <a:sp3d extrusionH="887400" prstMaterial="legacyWireframe">
+            <a:bevelT w="13500" h="13500" prst="angle"/>
+            <a:bevelB w="13500" h="13500" prst="angle"/>
+            <a:extrusionClr>
+              <a:schemeClr val="tx1"/>
+            </a:extrusionClr>
+          </a:sp3d>
+        </p:spPr>
+        <p:txBody>
+          <a:bodyPr wrap="none" anchor="ctr">
+            <a:flatTx/>
+          </a:bodyPr>
+          <a:lstStyle/>
+          <a:p>
+            <a:endParaRPr lang="en-US"/>
+          </a:p>
+        </p:txBody>
+      </p:sp>
+      <p:sp>
+        <p:nvSpPr>
+          <p:cNvPr id="3" name="Text Box 10">
+            <a:extLst>
+              <a:ext uri="{FF2B5EF4-FFF2-40B4-BE49-F238E27FC236}">
+                <a16:creationId xmlns:a16="http://schemas.microsoft.com/office/drawing/2014/main" id="{6CDE9CBC-A3E3-694E-8E94-CA23DF826CD4}"/>
+              </a:ext>
+            </a:extLst>
+          </p:cNvPr>
+          <p:cNvSpPr txBox="1">
+            <a:spLocks noChangeArrowheads="1"/>
+          </p:cNvSpPr>
+          <p:nvPr/>
+        </p:nvSpPr>
+        <p:spPr bwMode="auto">
+          <a:xfrm>
+            <a:off x="4342453" y="3571789"/>
+            <a:ext cx="441325" cy="519112"/>
+          </a:xfrm>
+          <a:prstGeom prst="rect">
+            <a:avLst/>
+          </a:prstGeom>
+          <a:noFill/>
+          <a:ln w="50800">
+            <a:noFill/>
+            <a:miter lim="800000"/>
+            <a:headEnd type="none" w="sm" len="sm"/>
+            <a:tailEnd type="none" w="med" len="sm"/>
+          </a:ln>
+          <a:effectLst/>
+        </p:spPr>
+        <p:txBody>
+          <a:bodyPr wrap="none" anchor="ctr">
+            <a:spAutoFit/>
+          </a:bodyPr>
+          <a:lstStyle/>
+          <a:p>
+            <a:pPr algn="ctr"/>
+            <a:r>
+              <a:rPr lang="en-US"/>
+              <a:t>H</a:t>
+            </a:r>
+          </a:p>
+        </p:txBody>
+      </p:sp>
+      <p:sp>
+        <p:nvSpPr>
+          <p:cNvPr id="4" name="Line 11">
+            <a:extLst>
+              <a:ext uri="{FF2B5EF4-FFF2-40B4-BE49-F238E27FC236}">
+                <a16:creationId xmlns:a16="http://schemas.microsoft.com/office/drawing/2014/main" id="{8081E7DD-8773-4F4D-A337-47C6EE1EDD64}"/>
+              </a:ext>
+            </a:extLst>
+          </p:cNvPr>
+          <p:cNvSpPr>
+            <a:spLocks noChangeShapeType="1"/>
+          </p:cNvSpPr>
+          <p:nvPr/>
+        </p:nvSpPr>
+        <p:spPr bwMode="auto">
+          <a:xfrm rot="16200000">
+            <a:off x="3479646" y="4061533"/>
+            <a:ext cx="2665413" cy="0"/>
+          </a:xfrm>
+          <a:prstGeom prst="line">
+            <a:avLst/>
+          </a:prstGeom>
+          <a:noFill/>
+          <a:ln w="19050">
+            <a:solidFill>
+              <a:schemeClr val="tx1"/>
+            </a:solidFill>
+            <a:round/>
+            <a:headEnd type="triangle" w="med" len="med"/>
+            <a:tailEnd type="triangle" w="med" len="med"/>
+          </a:ln>
+          <a:effectLst/>
+        </p:spPr>
+        <p:txBody>
+          <a:bodyPr wrap="none" anchor="ctr"/>
+          <a:lstStyle/>
+          <a:p>
+            <a:endParaRPr lang="en-US"/>
+          </a:p>
+        </p:txBody>
+      </p:sp>
+      <p:sp>
+        <p:nvSpPr>
+          <p:cNvPr id="5" name="Line 12">
+            <a:extLst>
+              <a:ext uri="{FF2B5EF4-FFF2-40B4-BE49-F238E27FC236}">
+                <a16:creationId xmlns:a16="http://schemas.microsoft.com/office/drawing/2014/main" id="{0A687841-D2E2-9C43-BEB6-165CBA473A3B}"/>
+              </a:ext>
+            </a:extLst>
+          </p:cNvPr>
+          <p:cNvSpPr>
+            <a:spLocks noChangeShapeType="1"/>
+          </p:cNvSpPr>
+          <p:nvPr/>
+        </p:nvSpPr>
+        <p:spPr bwMode="auto">
+          <a:xfrm rot="5400000">
+            <a:off x="6027585" y="1706634"/>
+            <a:ext cx="0" cy="1116013"/>
+          </a:xfrm>
+          <a:prstGeom prst="line">
+            <a:avLst/>
+          </a:prstGeom>
+          <a:noFill/>
+          <a:ln w="19050">
+            <a:solidFill>
+              <a:schemeClr val="tx1"/>
+            </a:solidFill>
+            <a:round/>
+            <a:headEnd type="triangle" w="med" len="med"/>
+            <a:tailEnd type="triangle" w="med" len="med"/>
+          </a:ln>
+          <a:effectLst/>
+        </p:spPr>
+        <p:txBody>
+          <a:bodyPr wrap="none" anchor="ctr"/>
+          <a:lstStyle/>
+          <a:p>
+            <a:endParaRPr lang="en-US"/>
+          </a:p>
+        </p:txBody>
+      </p:sp>
+      <p:sp>
+        <p:nvSpPr>
+          <p:cNvPr id="6" name="Text Box 13">
+            <a:extLst>
+              <a:ext uri="{FF2B5EF4-FFF2-40B4-BE49-F238E27FC236}">
+                <a16:creationId xmlns:a16="http://schemas.microsoft.com/office/drawing/2014/main" id="{99C2597D-F0C0-1642-BB60-88EB37807CE4}"/>
+              </a:ext>
+            </a:extLst>
+          </p:cNvPr>
+          <p:cNvSpPr txBox="1">
+            <a:spLocks noChangeArrowheads="1"/>
+          </p:cNvSpPr>
+          <p:nvPr/>
+        </p:nvSpPr>
+        <p:spPr bwMode="auto">
+          <a:xfrm>
+            <a:off x="4523428" y="2043026"/>
+            <a:ext cx="519113" cy="519113"/>
+          </a:xfrm>
+          <a:prstGeom prst="rect">
+            <a:avLst/>
+          </a:prstGeom>
+          <a:noFill/>
+          <a:ln w="50800">
+            <a:noFill/>
+            <a:miter lim="800000"/>
+            <a:headEnd type="none" w="sm" len="sm"/>
+            <a:tailEnd type="none" w="med" len="sm"/>
+          </a:ln>
+          <a:effectLst/>
+        </p:spPr>
+        <p:txBody>
+          <a:bodyPr wrap="none" anchor="ctr">
+            <a:spAutoFit/>
+          </a:bodyPr>
+          <a:lstStyle/>
+          <a:p>
+            <a:pPr algn="ctr"/>
+            <a:r>
+              <a:rPr lang="en-US"/>
+              <a:t>W</a:t>
+            </a:r>
+          </a:p>
+        </p:txBody>
+      </p:sp>
+      <p:sp>
+        <p:nvSpPr>
+          <p:cNvPr id="7" name="Line 14">
+            <a:extLst>
+              <a:ext uri="{FF2B5EF4-FFF2-40B4-BE49-F238E27FC236}">
+                <a16:creationId xmlns:a16="http://schemas.microsoft.com/office/drawing/2014/main" id="{83E69A5E-952E-984F-B18E-DEA011465C53}"/>
+              </a:ext>
+            </a:extLst>
+          </p:cNvPr>
+          <p:cNvSpPr>
+            <a:spLocks noChangeShapeType="1"/>
+          </p:cNvSpPr>
+          <p:nvPr/>
+        </p:nvSpPr>
+        <p:spPr bwMode="auto">
+          <a:xfrm flipH="1">
+            <a:off x="4980628" y="2328776"/>
+            <a:ext cx="327025" cy="317500"/>
+          </a:xfrm>
+          <a:prstGeom prst="line">
+            <a:avLst/>
+          </a:prstGeom>
+          <a:noFill/>
+          <a:ln w="19050">
+            <a:solidFill>
+              <a:schemeClr val="tx1"/>
+            </a:solidFill>
+            <a:round/>
+            <a:headEnd type="triangle" w="med" len="med"/>
+            <a:tailEnd type="triangle" w="med" len="med"/>
+          </a:ln>
+          <a:effectLst/>
+        </p:spPr>
+        <p:txBody>
+          <a:bodyPr wrap="none" anchor="ctr"/>
+          <a:lstStyle/>
+          <a:p>
+            <a:endParaRPr lang="en-US"/>
+          </a:p>
+        </p:txBody>
+      </p:sp>
+      <p:sp>
+        <p:nvSpPr>
+          <p:cNvPr id="8" name="Text Box 15">
+            <a:extLst>
+              <a:ext uri="{FF2B5EF4-FFF2-40B4-BE49-F238E27FC236}">
+                <a16:creationId xmlns:a16="http://schemas.microsoft.com/office/drawing/2014/main" id="{67F5A8B8-D3C0-8344-81ED-8A653D2AD2B8}"/>
+              </a:ext>
+            </a:extLst>
+          </p:cNvPr>
+          <p:cNvSpPr txBox="1">
+            <a:spLocks noChangeArrowheads="1"/>
+          </p:cNvSpPr>
+          <p:nvPr/>
+        </p:nvSpPr>
+        <p:spPr bwMode="auto">
+          <a:xfrm>
+            <a:off x="5882328" y="1869989"/>
+            <a:ext cx="401638" cy="519112"/>
+          </a:xfrm>
+          <a:prstGeom prst="rect">
+            <a:avLst/>
+          </a:prstGeom>
+          <a:noFill/>
+          <a:ln w="50800">
+            <a:noFill/>
+            <a:miter lim="800000"/>
+            <a:headEnd type="none" w="sm" len="sm"/>
+            <a:tailEnd type="none" w="med" len="sm"/>
+          </a:ln>
+          <a:effectLst/>
+        </p:spPr>
+        <p:txBody>
+          <a:bodyPr wrap="none" anchor="ctr">
+            <a:spAutoFit/>
+          </a:bodyPr>
+          <a:lstStyle/>
+          <a:p>
+            <a:pPr algn="ctr"/>
+            <a:r>
+              <a:rPr lang="en-US" dirty="0"/>
+              <a:t>L</a:t>
+            </a:r>
+          </a:p>
+        </p:txBody>
+      </p:sp>
+      <p:sp>
+        <p:nvSpPr>
+          <p:cNvPr id="9" name="Text Box 16">
+            <a:extLst>
+              <a:ext uri="{FF2B5EF4-FFF2-40B4-BE49-F238E27FC236}">
+                <a16:creationId xmlns:a16="http://schemas.microsoft.com/office/drawing/2014/main" id="{3C4C6DFC-B51E-BB47-88A1-DCC626CDE441}"/>
+              </a:ext>
+            </a:extLst>
+          </p:cNvPr>
+          <p:cNvSpPr txBox="1">
+            <a:spLocks noChangeArrowheads="1"/>
+          </p:cNvSpPr>
+          <p:nvPr/>
+        </p:nvSpPr>
+        <p:spPr bwMode="auto">
+          <a:xfrm>
+            <a:off x="5212403" y="5668876"/>
+            <a:ext cx="1398140" cy="523220"/>
+          </a:xfrm>
+          <a:prstGeom prst="rect">
+            <a:avLst/>
+          </a:prstGeom>
+          <a:noFill/>
+          <a:ln w="12700">
+            <a:noFill/>
+            <a:miter lim="800000"/>
+            <a:headEnd type="none" w="lg" len="med"/>
+            <a:tailEnd type="none" w="lg" len="med"/>
+          </a:ln>
+          <a:effectLst/>
+        </p:spPr>
+        <p:txBody>
+          <a:bodyPr wrap="none">
+            <a:spAutoFit/>
+          </a:bodyPr>
+          <a:lstStyle/>
+          <a:p>
+            <a:r>
+              <a:rPr lang="en-US" dirty="0"/>
+              <a:t>entrance</a:t>
+            </a:r>
+          </a:p>
+        </p:txBody>
+      </p:sp>
+      <p:sp>
+        <p:nvSpPr>
+          <p:cNvPr id="10" name="Text Box 17">
+            <a:extLst>
+              <a:ext uri="{FF2B5EF4-FFF2-40B4-BE49-F238E27FC236}">
+                <a16:creationId xmlns:a16="http://schemas.microsoft.com/office/drawing/2014/main" id="{C9BB5CC6-F059-854A-B1BE-3A21FA6E3CB1}"/>
+              </a:ext>
+            </a:extLst>
+          </p:cNvPr>
+          <p:cNvSpPr txBox="1">
+            <a:spLocks noChangeArrowheads="1"/>
+          </p:cNvSpPr>
+          <p:nvPr/>
+        </p:nvSpPr>
+        <p:spPr bwMode="auto">
+          <a:xfrm>
+            <a:off x="5374328" y="1354051"/>
+            <a:ext cx="721672" cy="523220"/>
+          </a:xfrm>
+          <a:prstGeom prst="rect">
+            <a:avLst/>
+          </a:prstGeom>
+          <a:noFill/>
+          <a:ln w="12700">
+            <a:noFill/>
+            <a:miter lim="800000"/>
+            <a:headEnd type="none" w="lg" len="med"/>
+            <a:tailEnd type="none" w="lg" len="med"/>
+          </a:ln>
+          <a:effectLst/>
+        </p:spPr>
+        <p:txBody>
+          <a:bodyPr wrap="none">
+            <a:spAutoFit/>
+          </a:bodyPr>
+          <a:lstStyle/>
+          <a:p>
+            <a:r>
+              <a:rPr lang="en-US" dirty="0"/>
+              <a:t>exit</a:t>
+            </a:r>
+          </a:p>
+        </p:txBody>
+      </p:sp>
+      <p:sp>
+        <p:nvSpPr>
+          <p:cNvPr id="11" name="Line 18">
+            <a:extLst>
+              <a:ext uri="{FF2B5EF4-FFF2-40B4-BE49-F238E27FC236}">
+                <a16:creationId xmlns:a16="http://schemas.microsoft.com/office/drawing/2014/main" id="{7CBE2DEE-79C5-3847-8B58-6A95D9389B3E}"/>
+              </a:ext>
+            </a:extLst>
+          </p:cNvPr>
+          <p:cNvSpPr>
+            <a:spLocks noChangeShapeType="1"/>
+          </p:cNvSpPr>
+          <p:nvPr/>
+        </p:nvSpPr>
+        <p:spPr bwMode="auto">
+          <a:xfrm flipV="1">
+            <a:off x="5790253" y="5183101"/>
+            <a:ext cx="0" cy="552450"/>
+          </a:xfrm>
+          <a:prstGeom prst="line">
+            <a:avLst/>
+          </a:prstGeom>
+          <a:noFill/>
+          <a:ln w="12700">
+            <a:solidFill>
+              <a:schemeClr val="tx1"/>
+            </a:solidFill>
+            <a:round/>
+            <a:headEnd type="none" w="lg" len="med"/>
+            <a:tailEnd type="triangle" w="lg" len="med"/>
+          </a:ln>
+          <a:effectLst/>
+        </p:spPr>
+        <p:txBody>
+          <a:bodyPr anchor="ctr">
+            <a:spAutoFit/>
+          </a:bodyPr>
+          <a:lstStyle/>
+          <a:p>
+            <a:endParaRPr lang="en-US"/>
+          </a:p>
+        </p:txBody>
+      </p:sp>
+      <p:sp>
+        <p:nvSpPr>
+          <p:cNvPr id="12" name="Line 19">
+            <a:extLst>
+              <a:ext uri="{FF2B5EF4-FFF2-40B4-BE49-F238E27FC236}">
+                <a16:creationId xmlns:a16="http://schemas.microsoft.com/office/drawing/2014/main" id="{EC1F5C17-0430-0242-932D-E350C9DD6EC2}"/>
+              </a:ext>
+            </a:extLst>
+          </p:cNvPr>
+          <p:cNvSpPr>
+            <a:spLocks noChangeShapeType="1"/>
+          </p:cNvSpPr>
+          <p:nvPr/>
+        </p:nvSpPr>
+        <p:spPr bwMode="auto">
+          <a:xfrm flipH="1" flipV="1">
+            <a:off x="5828353" y="1773151"/>
+            <a:ext cx="0" cy="742950"/>
+          </a:xfrm>
+          <a:prstGeom prst="line">
+            <a:avLst/>
+          </a:prstGeom>
+          <a:noFill/>
+          <a:ln w="12700">
+            <a:solidFill>
+              <a:schemeClr val="tx1"/>
+            </a:solidFill>
+            <a:round/>
+            <a:headEnd type="none" w="lg" len="med"/>
+            <a:tailEnd type="triangle" w="lg" len="med"/>
+          </a:ln>
+          <a:effectLst/>
+        </p:spPr>
+        <p:txBody>
+          <a:bodyPr anchor="ctr">
+            <a:spAutoFit/>
+          </a:bodyPr>
+          <a:lstStyle/>
+          <a:p>
+            <a:endParaRPr lang="en-US"/>
+          </a:p>
+        </p:txBody>
+      </p:sp>
+      <p:sp>
+        <p:nvSpPr>
+          <p:cNvPr id="13" name="TextBox 12">
+            <a:extLst>
+              <a:ext uri="{FF2B5EF4-FFF2-40B4-BE49-F238E27FC236}">
+                <a16:creationId xmlns:a16="http://schemas.microsoft.com/office/drawing/2014/main" id="{4ECA6BF2-6E28-284F-9FF8-16C0DC196527}"/>
+              </a:ext>
+            </a:extLst>
+          </p:cNvPr>
+          <p:cNvSpPr txBox="1"/>
+          <p:nvPr/>
+        </p:nvSpPr>
+        <p:spPr>
+          <a:xfrm>
+            <a:off x="73919" y="64701"/>
+            <a:ext cx="2885855" cy="369332"/>
+          </a:xfrm>
+          <a:prstGeom prst="rect">
+            <a:avLst/>
+          </a:prstGeom>
+          <a:noFill/>
+        </p:spPr>
+        <p:txBody>
+          <a:bodyPr wrap="none" rtlCol="0">
+            <a:spAutoFit/>
+          </a:bodyPr>
+          <a:lstStyle/>
+          <a:p>
+            <a:r>
+              <a:rPr lang="en-US" dirty="0" err="1"/>
+              <a:t>vertical_flow_tank_base.png</a:t>
+            </a:r>
+            <a:endParaRPr lang="en-US" dirty="0"/>
+          </a:p>
+        </p:txBody>
+      </p:sp>
+    </p:spTree>
+    <p:extLst>
+      <p:ext uri="{BB962C8B-B14F-4D97-AF65-F5344CB8AC3E}">
+        <p14:creationId xmlns:p14="http://schemas.microsoft.com/office/powerpoint/2010/main" val="2243120623"/>
+      </p:ext>
+    </p:extLst>
+  </p:cSld>
+  <p:clrMapOvr>
+    <a:masterClrMapping/>
+  </p:clrMapOvr>
 </p:sld>
 </file>
 

</xml_diff>

<commit_message>
overview of sed tank
</commit_message>
<xml_diff>
--- a/Sedimentation_Diagrams.pptx
+++ b/Sedimentation_Diagrams.pptx
@@ -14,6 +14,7 @@
     <p:sldId id="264" r:id="rId8"/>
     <p:sldId id="263" r:id="rId9"/>
     <p:sldId id="265" r:id="rId10"/>
+    <p:sldId id="266" r:id="rId11"/>
   </p:sldIdLst>
   <p:sldSz cx="12192000" cy="6858000"/>
   <p:notesSz cx="6858000" cy="9144000"/>
@@ -3342,6 +3343,487 @@
 </p:sld>
 </file>
 
+<file path=ppt/slides/slide10.xml><?xml version="1.0" encoding="utf-8"?>
+<p:sld xmlns:a="http://schemas.openxmlformats.org/drawingml/2006/main" xmlns:r="http://schemas.openxmlformats.org/officeDocument/2006/relationships" xmlns:p="http://schemas.openxmlformats.org/presentationml/2006/main">
+  <p:cSld>
+    <p:bg>
+      <p:bgPr>
+        <a:solidFill>
+          <a:schemeClr val="bg1"/>
+        </a:solidFill>
+        <a:effectLst/>
+      </p:bgPr>
+    </p:bg>
+    <p:spTree>
+      <p:nvGrpSpPr>
+        <p:cNvPr id="1" name=""/>
+        <p:cNvGrpSpPr/>
+        <p:nvPr/>
+      </p:nvGrpSpPr>
+      <p:grpSpPr>
+        <a:xfrm>
+          <a:off x="0" y="0"/>
+          <a:ext cx="0" cy="0"/>
+          <a:chOff x="0" y="0"/>
+          <a:chExt cx="0" cy="0"/>
+        </a:xfrm>
+      </p:grpSpPr>
+      <p:pic>
+        <p:nvPicPr>
+          <p:cNvPr id="2" name="Picture 5">
+            <a:extLst>
+              <a:ext uri="{FF2B5EF4-FFF2-40B4-BE49-F238E27FC236}">
+                <a16:creationId xmlns:a16="http://schemas.microsoft.com/office/drawing/2014/main" id="{F804AC81-B29E-6949-9503-9733867D261E}"/>
+              </a:ext>
+            </a:extLst>
+          </p:cNvPr>
+          <p:cNvPicPr>
+            <a:picLocks noChangeAspect="1" noChangeArrowheads="1"/>
+          </p:cNvPicPr>
+          <p:nvPr/>
+        </p:nvPicPr>
+        <p:blipFill>
+          <a:blip r:embed="rId2">
+            <a:extLst>
+              <a:ext uri="{28A0092B-C50C-407E-A947-70E740481C1C}">
+                <a14:useLocalDpi xmlns:a14="http://schemas.microsoft.com/office/drawing/2010/main" val="0"/>
+              </a:ext>
+            </a:extLst>
+          </a:blip>
+          <a:srcRect/>
+          <a:stretch>
+            <a:fillRect/>
+          </a:stretch>
+        </p:blipFill>
+        <p:spPr bwMode="auto">
+          <a:xfrm>
+            <a:off x="643467" y="757258"/>
+            <a:ext cx="10905066" cy="5343482"/>
+          </a:xfrm>
+          <a:prstGeom prst="rect">
+            <a:avLst/>
+          </a:prstGeom>
+          <a:noFill/>
+          <a:extLst>
+            <a:ext uri="{909E8E84-426E-40DD-AFC4-6F175D3DCCD1}">
+              <a14:hiddenFill xmlns:a14="http://schemas.microsoft.com/office/drawing/2010/main">
+                <a:solidFill>
+                  <a:schemeClr val="accent1"/>
+                </a:solidFill>
+              </a14:hiddenFill>
+            </a:ext>
+            <a:ext uri="{91240B29-F687-4F45-9708-019B960494DF}">
+              <a14:hiddenLine xmlns:a14="http://schemas.microsoft.com/office/drawing/2010/main" w="9525">
+                <a:solidFill>
+                  <a:schemeClr val="tx1"/>
+                </a:solidFill>
+                <a:miter lim="800000"/>
+                <a:headEnd/>
+                <a:tailEnd/>
+              </a14:hiddenLine>
+            </a:ext>
+            <a:ext uri="{AF507438-7753-43E0-B8FC-AC1667EBCBE1}">
+              <a14:hiddenEffects xmlns:a14="http://schemas.microsoft.com/office/drawing/2010/main">
+                <a:effectLst>
+                  <a:outerShdw dist="35921" dir="2700000" algn="ctr" rotWithShape="0">
+                    <a:schemeClr val="bg2"/>
+                  </a:outerShdw>
+                </a:effectLst>
+              </a14:hiddenEffects>
+            </a:ext>
+          </a:extLst>
+        </p:spPr>
+      </p:pic>
+      <p:pic>
+        <p:nvPicPr>
+          <p:cNvPr id="6" name="Picture 5">
+            <a:extLst>
+              <a:ext uri="{FF2B5EF4-FFF2-40B4-BE49-F238E27FC236}">
+                <a16:creationId xmlns:a16="http://schemas.microsoft.com/office/drawing/2014/main" id="{1D03B92C-FCD4-B748-923B-32E1B84852A0}"/>
+              </a:ext>
+            </a:extLst>
+          </p:cNvPr>
+          <p:cNvPicPr>
+            <a:picLocks noChangeAspect="1"/>
+          </p:cNvPicPr>
+          <p:nvPr/>
+        </p:nvPicPr>
+        <p:blipFill>
+          <a:blip r:embed="rId3"/>
+          <a:stretch>
+            <a:fillRect/>
+          </a:stretch>
+        </p:blipFill>
+        <p:spPr>
+          <a:xfrm>
+            <a:off x="3849892" y="2851663"/>
+            <a:ext cx="719190" cy="472304"/>
+          </a:xfrm>
+          <a:prstGeom prst="rect">
+            <a:avLst/>
+          </a:prstGeom>
+        </p:spPr>
+      </p:pic>
+      <p:pic>
+        <p:nvPicPr>
+          <p:cNvPr id="10" name="Picture 9">
+            <a:extLst>
+              <a:ext uri="{FF2B5EF4-FFF2-40B4-BE49-F238E27FC236}">
+                <a16:creationId xmlns:a16="http://schemas.microsoft.com/office/drawing/2014/main" id="{87EB2DC2-582E-7E4D-8F15-16B1B4B96CEC}"/>
+              </a:ext>
+            </a:extLst>
+          </p:cNvPr>
+          <p:cNvPicPr>
+            <a:picLocks noChangeAspect="1"/>
+          </p:cNvPicPr>
+          <p:nvPr/>
+        </p:nvPicPr>
+        <p:blipFill>
+          <a:blip r:embed="rId4"/>
+          <a:stretch>
+            <a:fillRect/>
+          </a:stretch>
+        </p:blipFill>
+        <p:spPr>
+          <a:xfrm>
+            <a:off x="3265692" y="2857840"/>
+            <a:ext cx="584200" cy="584200"/>
+          </a:xfrm>
+          <a:prstGeom prst="rect">
+            <a:avLst/>
+          </a:prstGeom>
+        </p:spPr>
+      </p:pic>
+      <p:pic>
+        <p:nvPicPr>
+          <p:cNvPr id="12" name="Picture 5">
+            <a:extLst>
+              <a:ext uri="{FF2B5EF4-FFF2-40B4-BE49-F238E27FC236}">
+                <a16:creationId xmlns:a16="http://schemas.microsoft.com/office/drawing/2014/main" id="{AA1B0D42-D246-1D44-822F-E7F792C2AE49}"/>
+              </a:ext>
+            </a:extLst>
+          </p:cNvPr>
+          <p:cNvPicPr>
+            <a:picLocks noChangeAspect="1" noChangeArrowheads="1"/>
+          </p:cNvPicPr>
+          <p:nvPr/>
+        </p:nvPicPr>
+        <p:blipFill rotWithShape="1">
+          <a:blip r:embed="rId5" cstate="print">
+            <a:extLst>
+              <a:ext uri="{28A0092B-C50C-407E-A947-70E740481C1C}">
+                <a14:useLocalDpi xmlns:a14="http://schemas.microsoft.com/office/drawing/2010/main" val="0"/>
+              </a:ext>
+            </a:extLst>
+          </a:blip>
+          <a:srcRect/>
+          <a:stretch/>
+        </p:blipFill>
+        <p:spPr bwMode="auto">
+          <a:xfrm>
+            <a:off x="3306040" y="2293405"/>
+            <a:ext cx="411532" cy="642620"/>
+          </a:xfrm>
+          <a:prstGeom prst="rect">
+            <a:avLst/>
+          </a:prstGeom>
+          <a:noFill/>
+          <a:ln>
+            <a:noFill/>
+          </a:ln>
+          <a:effectLst/>
+          <a:extLst>
+            <a:ext uri="{909E8E84-426E-40DD-AFC4-6F175D3DCCD1}">
+              <a14:hiddenFill xmlns:a14="http://schemas.microsoft.com/office/drawing/2010/main">
+                <a:solidFill>
+                  <a:schemeClr val="accent1"/>
+                </a:solidFill>
+              </a14:hiddenFill>
+            </a:ext>
+            <a:ext uri="{91240B29-F687-4F45-9708-019B960494DF}">
+              <a14:hiddenLine xmlns:a14="http://schemas.microsoft.com/office/drawing/2010/main" w="9525">
+                <a:solidFill>
+                  <a:schemeClr val="tx1"/>
+                </a:solidFill>
+                <a:miter lim="800000"/>
+                <a:headEnd/>
+                <a:tailEnd/>
+              </a14:hiddenLine>
+            </a:ext>
+            <a:ext uri="{AF507438-7753-43E0-B8FC-AC1667EBCBE1}">
+              <a14:hiddenEffects xmlns:a14="http://schemas.microsoft.com/office/drawing/2010/main">
+                <a:effectLst>
+                  <a:outerShdw dist="35921" dir="2700000" algn="ctr" rotWithShape="0">
+                    <a:schemeClr val="bg2"/>
+                  </a:outerShdw>
+                </a:effectLst>
+              </a14:hiddenEffects>
+            </a:ext>
+          </a:extLst>
+        </p:spPr>
+      </p:pic>
+      <p:sp>
+        <p:nvSpPr>
+          <p:cNvPr id="14" name="Block Arc 13">
+            <a:extLst>
+              <a:ext uri="{FF2B5EF4-FFF2-40B4-BE49-F238E27FC236}">
+                <a16:creationId xmlns:a16="http://schemas.microsoft.com/office/drawing/2014/main" id="{EA2DACFD-AE9F-AE47-BF4E-B1245F8381A4}"/>
+              </a:ext>
+            </a:extLst>
+          </p:cNvPr>
+          <p:cNvSpPr/>
+          <p:nvPr/>
+        </p:nvSpPr>
+        <p:spPr bwMode="auto">
+          <a:xfrm rot="10800000">
+            <a:off x="2314990" y="2335635"/>
+            <a:ext cx="1396501" cy="1421362"/>
+          </a:xfrm>
+          <a:prstGeom prst="blockArc">
+            <a:avLst>
+              <a:gd name="adj1" fmla="val 10800000"/>
+              <a:gd name="adj2" fmla="val 16200005"/>
+              <a:gd name="adj3" fmla="val 25784"/>
+            </a:avLst>
+          </a:prstGeom>
+          <a:solidFill>
+            <a:srgbClr val="A8C0D5"/>
+          </a:solidFill>
+          <a:ln w="12700" cap="flat" cmpd="sng" algn="ctr">
+            <a:solidFill>
+              <a:srgbClr val="98B7D0"/>
+            </a:solidFill>
+            <a:prstDash val="solid"/>
+            <a:round/>
+            <a:headEnd type="none" w="lg" len="med"/>
+            <a:tailEnd type="none" w="lg" len="med"/>
+          </a:ln>
+          <a:effectLst/>
+        </p:spPr>
+        <p:txBody>
+          <a:bodyPr vert="horz" wrap="square" lIns="91440" tIns="45720" rIns="91440" bIns="45720" numCol="1" rtlCol="0" anchor="ctr" anchorCtr="0" compatLnSpc="1">
+            <a:prstTxWarp prst="textNoShape">
+              <a:avLst/>
+            </a:prstTxWarp>
+            <a:spAutoFit/>
+          </a:bodyPr>
+          <a:lstStyle/>
+          <a:p>
+            <a:pPr marL="0" marR="0" indent="0" algn="l" defTabSz="914400" rtl="0" eaLnBrk="1" fontAlgn="base" latinLnBrk="0" hangingPunct="1">
+              <a:lnSpc>
+                <a:spcPct val="100000"/>
+              </a:lnSpc>
+              <a:spcBef>
+                <a:spcPct val="0"/>
+              </a:spcBef>
+              <a:spcAft>
+                <a:spcPct val="0"/>
+              </a:spcAft>
+              <a:buClrTx/>
+              <a:buSzTx/>
+              <a:buFontTx/>
+              <a:buNone/>
+              <a:tabLst/>
+            </a:pPr>
+            <a:endParaRPr kumimoji="0" lang="en-US" sz="1800" b="0" i="0" u="none" strike="noStrike" cap="none" normalizeH="0" baseline="0">
+              <a:ln>
+                <a:noFill/>
+              </a:ln>
+              <a:solidFill>
+                <a:schemeClr val="tx1"/>
+              </a:solidFill>
+              <a:effectLst/>
+              <a:latin typeface="Century Gothic" pitchFamily="34" charset="0"/>
+              <a:cs typeface="Arial" charset="0"/>
+            </a:endParaRPr>
+          </a:p>
+        </p:txBody>
+      </p:sp>
+      <p:pic>
+        <p:nvPicPr>
+          <p:cNvPr id="13" name="Picture 5">
+            <a:extLst>
+              <a:ext uri="{FF2B5EF4-FFF2-40B4-BE49-F238E27FC236}">
+                <a16:creationId xmlns:a16="http://schemas.microsoft.com/office/drawing/2014/main" id="{C4F9B916-A087-5B4C-8C45-13F2E0387D19}"/>
+              </a:ext>
+            </a:extLst>
+          </p:cNvPr>
+          <p:cNvPicPr>
+            <a:picLocks noChangeAspect="1" noChangeArrowheads="1"/>
+          </p:cNvPicPr>
+          <p:nvPr/>
+        </p:nvPicPr>
+        <p:blipFill rotWithShape="1">
+          <a:blip r:embed="rId6" cstate="print">
+            <a:extLst>
+              <a:ext uri="{28A0092B-C50C-407E-A947-70E740481C1C}">
+                <a14:useLocalDpi xmlns:a14="http://schemas.microsoft.com/office/drawing/2010/main" val="0"/>
+              </a:ext>
+            </a:extLst>
+          </a:blip>
+          <a:srcRect/>
+          <a:stretch/>
+        </p:blipFill>
+        <p:spPr bwMode="auto">
+          <a:xfrm rot="10800000">
+            <a:off x="3264086" y="2736820"/>
+            <a:ext cx="464303" cy="419786"/>
+          </a:xfrm>
+          <a:prstGeom prst="rect">
+            <a:avLst/>
+          </a:prstGeom>
+          <a:noFill/>
+          <a:ln>
+            <a:noFill/>
+          </a:ln>
+          <a:effectLst/>
+          <a:extLst>
+            <a:ext uri="{909E8E84-426E-40DD-AFC4-6F175D3DCCD1}">
+              <a14:hiddenFill xmlns:a14="http://schemas.microsoft.com/office/drawing/2010/main">
+                <a:solidFill>
+                  <a:schemeClr val="accent1"/>
+                </a:solidFill>
+              </a14:hiddenFill>
+            </a:ext>
+            <a:ext uri="{91240B29-F687-4F45-9708-019B960494DF}">
+              <a14:hiddenLine xmlns:a14="http://schemas.microsoft.com/office/drawing/2010/main" w="9525">
+                <a:solidFill>
+                  <a:schemeClr val="tx1"/>
+                </a:solidFill>
+                <a:miter lim="800000"/>
+                <a:headEnd/>
+                <a:tailEnd/>
+              </a14:hiddenLine>
+            </a:ext>
+            <a:ext uri="{AF507438-7753-43E0-B8FC-AC1667EBCBE1}">
+              <a14:hiddenEffects xmlns:a14="http://schemas.microsoft.com/office/drawing/2010/main">
+                <a:effectLst>
+                  <a:outerShdw dist="35921" dir="2700000" algn="ctr" rotWithShape="0">
+                    <a:schemeClr val="bg2"/>
+                  </a:outerShdw>
+                </a:effectLst>
+              </a14:hiddenEffects>
+            </a:ext>
+          </a:extLst>
+        </p:spPr>
+      </p:pic>
+      <p:pic>
+        <p:nvPicPr>
+          <p:cNvPr id="11" name="Picture 5">
+            <a:extLst>
+              <a:ext uri="{FF2B5EF4-FFF2-40B4-BE49-F238E27FC236}">
+                <a16:creationId xmlns:a16="http://schemas.microsoft.com/office/drawing/2014/main" id="{8BDF1C1A-DB59-7649-892D-F50D86D5A3C0}"/>
+              </a:ext>
+            </a:extLst>
+          </p:cNvPr>
+          <p:cNvPicPr>
+            <a:picLocks noChangeAspect="1" noChangeArrowheads="1"/>
+          </p:cNvPicPr>
+          <p:nvPr/>
+        </p:nvPicPr>
+        <p:blipFill rotWithShape="1">
+          <a:blip r:embed="rId7" cstate="print">
+            <a:extLst>
+              <a:ext uri="{28A0092B-C50C-407E-A947-70E740481C1C}">
+                <a14:useLocalDpi xmlns:a14="http://schemas.microsoft.com/office/drawing/2010/main" val="0"/>
+              </a:ext>
+            </a:extLst>
+          </a:blip>
+          <a:srcRect/>
+          <a:stretch/>
+        </p:blipFill>
+        <p:spPr bwMode="auto">
+          <a:xfrm rot="5400000">
+            <a:off x="2331812" y="2876487"/>
+            <a:ext cx="388060" cy="1396501"/>
+          </a:xfrm>
+          <a:prstGeom prst="rect">
+            <a:avLst/>
+          </a:prstGeom>
+          <a:noFill/>
+          <a:ln>
+            <a:noFill/>
+          </a:ln>
+          <a:effectLst/>
+          <a:extLst>
+            <a:ext uri="{909E8E84-426E-40DD-AFC4-6F175D3DCCD1}">
+              <a14:hiddenFill xmlns:a14="http://schemas.microsoft.com/office/drawing/2010/main">
+                <a:solidFill>
+                  <a:schemeClr val="accent1"/>
+                </a:solidFill>
+              </a14:hiddenFill>
+            </a:ext>
+            <a:ext uri="{91240B29-F687-4F45-9708-019B960494DF}">
+              <a14:hiddenLine xmlns:a14="http://schemas.microsoft.com/office/drawing/2010/main" w="9525">
+                <a:solidFill>
+                  <a:schemeClr val="tx1"/>
+                </a:solidFill>
+                <a:miter lim="800000"/>
+                <a:headEnd/>
+                <a:tailEnd/>
+              </a14:hiddenLine>
+            </a:ext>
+            <a:ext uri="{AF507438-7753-43E0-B8FC-AC1667EBCBE1}">
+              <a14:hiddenEffects xmlns:a14="http://schemas.microsoft.com/office/drawing/2010/main">
+                <a:effectLst>
+                  <a:outerShdw dist="35921" dir="2700000" algn="ctr" rotWithShape="0">
+                    <a:schemeClr val="bg2"/>
+                  </a:outerShdw>
+                </a:effectLst>
+              </a14:hiddenEffects>
+            </a:ext>
+          </a:extLst>
+        </p:spPr>
+      </p:pic>
+      <p:sp>
+        <p:nvSpPr>
+          <p:cNvPr id="15" name="TextBox 14">
+            <a:extLst>
+              <a:ext uri="{FF2B5EF4-FFF2-40B4-BE49-F238E27FC236}">
+                <a16:creationId xmlns:a16="http://schemas.microsoft.com/office/drawing/2014/main" id="{246359A3-3EC4-E242-ABF7-3114C41D8884}"/>
+              </a:ext>
+            </a:extLst>
+          </p:cNvPr>
+          <p:cNvSpPr txBox="1"/>
+          <p:nvPr/>
+        </p:nvSpPr>
+        <p:spPr>
+          <a:xfrm>
+            <a:off x="73919" y="64701"/>
+            <a:ext cx="2405787" cy="369332"/>
+          </a:xfrm>
+          <a:prstGeom prst="rect">
+            <a:avLst/>
+          </a:prstGeom>
+          <a:noFill/>
+        </p:spPr>
+        <p:txBody>
+          <a:bodyPr wrap="none" rtlCol="0">
+            <a:spAutoFit/>
+          </a:bodyPr>
+          <a:lstStyle/>
+          <a:p>
+            <a:r>
+              <a:rPr lang="en-US" dirty="0" err="1"/>
+              <a:t>sed_tank_overview.png</a:t>
+            </a:r>
+            <a:endParaRPr lang="en-US" dirty="0"/>
+          </a:p>
+        </p:txBody>
+      </p:sp>
+    </p:spTree>
+    <p:extLst>
+      <p:ext uri="{BB962C8B-B14F-4D97-AF65-F5344CB8AC3E}">
+        <p14:creationId xmlns:p14="http://schemas.microsoft.com/office/powerpoint/2010/main" val="29492718"/>
+      </p:ext>
+    </p:extLst>
+  </p:cSld>
+  <p:clrMapOvr>
+    <a:masterClrMapping/>
+  </p:clrMapOvr>
+</p:sld>
+</file>
+
 <file path=ppt/slides/slide2.xml><?xml version="1.0" encoding="utf-8"?>
 <p:sld xmlns:a="http://schemas.openxmlformats.org/drawingml/2006/main" xmlns:r="http://schemas.openxmlformats.org/officeDocument/2006/relationships" xmlns:p="http://schemas.openxmlformats.org/presentationml/2006/main">
   <p:cSld>
@@ -3996,7 +4478,7 @@
           <a:graphicData uri="http://schemas.openxmlformats.org/presentationml/2006/ole">
             <mc:AlternateContent xmlns:mc="http://schemas.openxmlformats.org/markup-compatibility/2006">
               <mc:Choice xmlns:v="urn:schemas-microsoft-com:vml" Requires="v">
-                <p:oleObj spid="_x0000_s2067" name="Worksheet" r:id="rId3" imgW="8210421" imgH="4238730" progId="Excel.Sheet.8">
+                <p:oleObj spid="_x0000_s2069" name="Worksheet" r:id="rId3" imgW="8210421" imgH="4238730" progId="Excel.Sheet.8">
                   <p:embed followColorScheme="full"/>
                 </p:oleObj>
               </mc:Choice>
@@ -4507,7 +4989,7 @@
           <a:graphicData uri="http://schemas.openxmlformats.org/presentationml/2006/ole">
             <mc:AlternateContent xmlns:mc="http://schemas.openxmlformats.org/markup-compatibility/2006">
               <mc:Choice xmlns:v="urn:schemas-microsoft-com:vml" Requires="v">
-                <p:oleObj spid="_x0000_s3163" name="Worksheet" r:id="rId3" imgW="8210421" imgH="4238730" progId="Excel.Sheet.8">
+                <p:oleObj spid="_x0000_s3173" name="Worksheet" r:id="rId3" imgW="8210421" imgH="4238730" progId="Excel.Sheet.8">
                   <p:embed followColorScheme="full"/>
                 </p:oleObj>
               </mc:Choice>
@@ -4660,7 +5142,7 @@
           <a:graphicData uri="http://schemas.openxmlformats.org/presentationml/2006/ole">
             <mc:AlternateContent xmlns:mc="http://schemas.openxmlformats.org/markup-compatibility/2006">
               <mc:Choice xmlns:v="urn:schemas-microsoft-com:vml" Requires="v">
-                <p:oleObj spid="_x0000_s3164" name="Equation" r:id="rId5" imgW="1143000" imgH="736560" progId="Equation.DSMT4">
+                <p:oleObj spid="_x0000_s3174" name="Equation" r:id="rId5" imgW="1143000" imgH="736560" progId="Equation.DSMT4">
                   <p:embed/>
                 </p:oleObj>
               </mc:Choice>
@@ -4921,7 +5403,7 @@
           <a:graphicData uri="http://schemas.openxmlformats.org/presentationml/2006/ole">
             <mc:AlternateContent xmlns:mc="http://schemas.openxmlformats.org/markup-compatibility/2006">
               <mc:Choice xmlns:v="urn:schemas-microsoft-com:vml" Requires="v">
-                <p:oleObj spid="_x0000_s3165" name="Equation" r:id="rId7" imgW="2705040" imgH="901440" progId="Equation.DSMT4">
+                <p:oleObj spid="_x0000_s3175" name="Equation" r:id="rId7" imgW="2705040" imgH="901440" progId="Equation.DSMT4">
                   <p:embed/>
                 </p:oleObj>
               </mc:Choice>
@@ -5029,7 +5511,7 @@
           <a:graphicData uri="http://schemas.openxmlformats.org/presentationml/2006/ole">
             <mc:AlternateContent xmlns:mc="http://schemas.openxmlformats.org/markup-compatibility/2006">
               <mc:Choice xmlns:v="urn:schemas-microsoft-com:vml" Requires="v">
-                <p:oleObj spid="_x0000_s3166" name="Equation" r:id="rId9" imgW="3276360" imgH="1091880" progId="Equation.DSMT4">
+                <p:oleObj spid="_x0000_s3176" name="Equation" r:id="rId9" imgW="3276360" imgH="1091880" progId="Equation.DSMT4">
                   <p:embed/>
                 </p:oleObj>
               </mc:Choice>
@@ -5143,7 +5625,7 @@
           <a:graphicData uri="http://schemas.openxmlformats.org/presentationml/2006/ole">
             <mc:AlternateContent xmlns:mc="http://schemas.openxmlformats.org/markup-compatibility/2006">
               <mc:Choice xmlns:v="urn:schemas-microsoft-com:vml" Requires="v">
-                <p:oleObj spid="_x0000_s3167" name="Equation" r:id="rId11" imgW="1066680" imgH="736560" progId="Equation.DSMT4">
+                <p:oleObj spid="_x0000_s3177" name="Equation" r:id="rId11" imgW="1066680" imgH="736560" progId="Equation.DSMT4">
                   <p:embed/>
                 </p:oleObj>
               </mc:Choice>

</xml_diff>